<commit_message>
Add conclusions slides (#32)
* distances notebook

* distances notebook

* distances notebook

* convolution notebook

* dict and int notebook

* dict and int notebook

* dict and int notebook

* conclusions

* Update part10_conclusions.pptx
</commit_message>
<xml_diff>
--- a/KDD-2024/Slides/part9_hybrids.pptx
+++ b/KDD-2024/Slides/part9_hybrids.pptx
@@ -221,7 +221,7 @@
           <a:p>
             <a:fld id="{A208CC58-AEBA-4B81-AD4F-648E402612BD}" type="datetimeFigureOut">
               <a:rPr lang="en-GB" smtClean="0"/>
-              <a:t>21/08/2024</a:t>
+              <a:t>22/08/2024</a:t>
             </a:fld>
             <a:endParaRPr lang="en-GB"/>
           </a:p>
@@ -638,7 +638,7 @@
           <a:p>
             <a:fld id="{EDEC158B-FB0A-43FC-87BA-79B801717EB2}" type="datetimeFigureOut">
               <a:rPr lang="en-AU" smtClean="0"/>
-              <a:t>21/08/2024</a:t>
+              <a:t>22/08/2024</a:t>
             </a:fld>
             <a:endParaRPr lang="en-AU"/>
           </a:p>
@@ -838,7 +838,7 @@
           <a:p>
             <a:fld id="{EDEC158B-FB0A-43FC-87BA-79B801717EB2}" type="datetimeFigureOut">
               <a:rPr lang="en-AU" smtClean="0"/>
-              <a:t>21/08/2024</a:t>
+              <a:t>22/08/2024</a:t>
             </a:fld>
             <a:endParaRPr lang="en-AU"/>
           </a:p>
@@ -1048,7 +1048,7 @@
           <a:p>
             <a:fld id="{EDEC158B-FB0A-43FC-87BA-79B801717EB2}" type="datetimeFigureOut">
               <a:rPr lang="en-AU" smtClean="0"/>
-              <a:t>21/08/2024</a:t>
+              <a:t>22/08/2024</a:t>
             </a:fld>
             <a:endParaRPr lang="en-AU"/>
           </a:p>
@@ -1248,7 +1248,7 @@
           <a:p>
             <a:fld id="{EDEC158B-FB0A-43FC-87BA-79B801717EB2}" type="datetimeFigureOut">
               <a:rPr lang="en-AU" smtClean="0"/>
-              <a:t>21/08/2024</a:t>
+              <a:t>22/08/2024</a:t>
             </a:fld>
             <a:endParaRPr lang="en-AU"/>
           </a:p>
@@ -1524,7 +1524,7 @@
           <a:p>
             <a:fld id="{EDEC158B-FB0A-43FC-87BA-79B801717EB2}" type="datetimeFigureOut">
               <a:rPr lang="en-AU" smtClean="0"/>
-              <a:t>21/08/2024</a:t>
+              <a:t>22/08/2024</a:t>
             </a:fld>
             <a:endParaRPr lang="en-AU"/>
           </a:p>
@@ -1792,7 +1792,7 @@
           <a:p>
             <a:fld id="{EDEC158B-FB0A-43FC-87BA-79B801717EB2}" type="datetimeFigureOut">
               <a:rPr lang="en-AU" smtClean="0"/>
-              <a:t>21/08/2024</a:t>
+              <a:t>22/08/2024</a:t>
             </a:fld>
             <a:endParaRPr lang="en-AU"/>
           </a:p>
@@ -2207,7 +2207,7 @@
           <a:p>
             <a:fld id="{EDEC158B-FB0A-43FC-87BA-79B801717EB2}" type="datetimeFigureOut">
               <a:rPr lang="en-AU" smtClean="0"/>
-              <a:t>21/08/2024</a:t>
+              <a:t>22/08/2024</a:t>
             </a:fld>
             <a:endParaRPr lang="en-AU"/>
           </a:p>
@@ -2349,7 +2349,7 @@
           <a:p>
             <a:fld id="{EDEC158B-FB0A-43FC-87BA-79B801717EB2}" type="datetimeFigureOut">
               <a:rPr lang="en-AU" smtClean="0"/>
-              <a:t>21/08/2024</a:t>
+              <a:t>22/08/2024</a:t>
             </a:fld>
             <a:endParaRPr lang="en-AU"/>
           </a:p>
@@ -2462,7 +2462,7 @@
           <a:p>
             <a:fld id="{EDEC158B-FB0A-43FC-87BA-79B801717EB2}" type="datetimeFigureOut">
               <a:rPr lang="en-AU" smtClean="0"/>
-              <a:t>21/08/2024</a:t>
+              <a:t>22/08/2024</a:t>
             </a:fld>
             <a:endParaRPr lang="en-AU"/>
           </a:p>
@@ -2775,7 +2775,7 @@
           <a:p>
             <a:fld id="{EDEC158B-FB0A-43FC-87BA-79B801717EB2}" type="datetimeFigureOut">
               <a:rPr lang="en-AU" smtClean="0"/>
-              <a:t>21/08/2024</a:t>
+              <a:t>22/08/2024</a:t>
             </a:fld>
             <a:endParaRPr lang="en-AU"/>
           </a:p>
@@ -3064,7 +3064,7 @@
           <a:p>
             <a:fld id="{EDEC158B-FB0A-43FC-87BA-79B801717EB2}" type="datetimeFigureOut">
               <a:rPr lang="en-AU" smtClean="0"/>
-              <a:t>21/08/2024</a:t>
+              <a:t>22/08/2024</a:t>
             </a:fld>
             <a:endParaRPr lang="en-AU"/>
           </a:p>
@@ -3307,7 +3307,7 @@
           <a:p>
             <a:fld id="{EDEC158B-FB0A-43FC-87BA-79B801717EB2}" type="datetimeFigureOut">
               <a:rPr lang="en-AU" smtClean="0"/>
-              <a:t>21/08/2024</a:t>
+              <a:t>22/08/2024</a:t>
             </a:fld>
             <a:endParaRPr lang="en-AU"/>
           </a:p>
@@ -9041,8 +9041,8 @@
         </p:blipFill>
         <p:spPr>
           <a:xfrm>
-            <a:off x="224408" y="1489753"/>
-            <a:ext cx="7991612" cy="3470390"/>
+            <a:off x="0" y="1136072"/>
+            <a:ext cx="6870542" cy="2983561"/>
           </a:xfrm>
           <a:prstGeom prst="rect">
             <a:avLst/>
@@ -9061,8 +9061,8 @@
         </p:nvSpPr>
         <p:spPr>
           <a:xfrm>
-            <a:off x="766618" y="80607"/>
-            <a:ext cx="11046691" cy="824557"/>
+            <a:off x="2115127" y="178894"/>
+            <a:ext cx="6511637" cy="824557"/>
           </a:xfrm>
         </p:spPr>
         <p:txBody>
@@ -9099,7 +9099,7 @@
         </p:nvSpPr>
         <p:spPr>
           <a:xfrm>
-            <a:off x="100374" y="5066617"/>
+            <a:off x="221059" y="4451928"/>
             <a:ext cx="11749881" cy="1270000"/>
           </a:xfrm>
           <a:prstGeom prst="rect">
@@ -9173,12 +9173,57 @@
           </a:p>
         </p:txBody>
       </p:sp>
+      <p:sp>
+        <p:nvSpPr>
+          <p:cNvPr id="3" name="AutoShape 2">
+            <a:extLst>
+              <a:ext uri="{FF2B5EF4-FFF2-40B4-BE49-F238E27FC236}">
+                <a16:creationId xmlns:a16="http://schemas.microsoft.com/office/drawing/2014/main" id="{BB382987-710D-6EEF-F9C3-57D2B3EEA093}"/>
+              </a:ext>
+            </a:extLst>
+          </p:cNvPr>
+          <p:cNvSpPr>
+            <a:spLocks noChangeAspect="1" noChangeArrowheads="1"/>
+          </p:cNvSpPr>
+          <p:nvPr/>
+        </p:nvSpPr>
+        <p:spPr bwMode="auto">
+          <a:xfrm>
+            <a:off x="5943600" y="3276600"/>
+            <a:ext cx="304800" cy="304800"/>
+          </a:xfrm>
+          <a:prstGeom prst="rect">
+            <a:avLst/>
+          </a:prstGeom>
+          <a:noFill/>
+          <a:extLst>
+            <a:ext uri="{909E8E84-426E-40DD-AFC4-6F175D3DCCD1}">
+              <a14:hiddenFill xmlns:a14="http://schemas.microsoft.com/office/drawing/2010/main">
+                <a:solidFill>
+                  <a:srgbClr val="FFFFFF"/>
+                </a:solidFill>
+              </a14:hiddenFill>
+            </a:ext>
+          </a:extLst>
+        </p:spPr>
+        <p:txBody>
+          <a:bodyPr vert="horz" wrap="square" lIns="91440" tIns="45720" rIns="91440" bIns="45720" numCol="1" anchor="t" anchorCtr="0" compatLnSpc="1">
+            <a:prstTxWarp prst="textNoShape">
+              <a:avLst/>
+            </a:prstTxWarp>
+          </a:bodyPr>
+          <a:lstStyle/>
+          <a:p>
+            <a:endParaRPr lang="en-GB"/>
+          </a:p>
+        </p:txBody>
+      </p:sp>
       <p:pic>
         <p:nvPicPr>
-          <p:cNvPr id="7" name="Picture 6">
-            <a:extLst>
-              <a:ext uri="{FF2B5EF4-FFF2-40B4-BE49-F238E27FC236}">
-                <a16:creationId xmlns:a16="http://schemas.microsoft.com/office/drawing/2014/main" id="{C8D98726-151F-F20E-B0B0-F8653B6000FB}"/>
+          <p:cNvPr id="8" name="Picture 7">
+            <a:extLst>
+              <a:ext uri="{FF2B5EF4-FFF2-40B4-BE49-F238E27FC236}">
+                <a16:creationId xmlns:a16="http://schemas.microsoft.com/office/drawing/2014/main" id="{709DD174-64C0-3C05-DA7B-4D0CD6248C4C}"/>
               </a:ext>
             </a:extLst>
           </p:cNvPr>
@@ -9195,8 +9240,8 @@
         </p:blipFill>
         <p:spPr>
           <a:xfrm>
-            <a:off x="6979217" y="0"/>
-            <a:ext cx="5212783" cy="2054831"/>
+            <a:off x="6721266" y="1169599"/>
+            <a:ext cx="5260031" cy="2626546"/>
           </a:xfrm>
           <a:prstGeom prst="rect">
             <a:avLst/>

</xml_diff>